<commit_message>
updated figures and drafts
</commit_message>
<xml_diff>
--- a/van_der_Waals_Paper/figures/Supp._WESTERNS/westerns.pptx
+++ b/van_der_Waals_Paper/figures/Supp._WESTERNS/westerns.pptx
@@ -7005,15 +7005,15 @@
               <a:buNone/>
             </a:pPr>
             <a:r>
-              <a:rPr lang="en-US" sz="4400" b="0" strike="noStrike" spc="-1">
+              <a:rPr lang="en-US" sz="4400" b="0" strike="noStrike" spc="-1" dirty="0">
                 <a:solidFill>
                   <a:srgbClr val="000000"/>
                 </a:solidFill>
                 <a:latin typeface="Aptos Display"/>
               </a:rPr>
-              <a:t>2025-5-13</a:t>
+              <a:t>2024-5-13</a:t>
             </a:r>
-            <a:endParaRPr lang="en-US" sz="4400" b="0" strike="noStrike" spc="-1">
+            <a:endParaRPr lang="en-US" sz="4400" b="0" strike="noStrike" spc="-1" dirty="0">
               <a:solidFill>
                 <a:srgbClr val="000000"/>
               </a:solidFill>

</xml_diff>